<commit_message>
update S0, S1, Syllabus
</commit_message>
<xml_diff>
--- a/Mignot/Diapos/S1 - diapo DECA2.pptx
+++ b/Mignot/Diapos/S1 - diapo DECA2.pptx
@@ -211,7 +211,7 @@
           <a:p>
             <a:fld id="{CCD25262-7ADE-304A-B1BB-4A7EDACB30E0}" type="datetimeFigureOut">
               <a:rPr lang="fr-FR" smtClean="0"/>
-              <a:t>08/01/2025</a:t>
+              <a:t>05/01/2026</a:t>
             </a:fld>
             <a:endParaRPr lang="fr-FR"/>
           </a:p>
@@ -1666,6 +1666,13 @@
             <a:schemeClr val="lt1"/>
           </a:fontRef>
         </p:style>
+        <p:txBody>
+          <a:bodyPr/>
+          <a:lstStyle/>
+          <a:p>
+            <a:endParaRPr lang="fr-FR"/>
+          </a:p>
+        </p:txBody>
       </p:sp>
       <p:sp>
         <p:nvSpPr>
@@ -1781,6 +1788,13 @@
             <a:schemeClr val="lt1"/>
           </a:fontRef>
         </p:style>
+        <p:txBody>
+          <a:bodyPr/>
+          <a:lstStyle/>
+          <a:p>
+            <a:endParaRPr lang="fr-FR"/>
+          </a:p>
+        </p:txBody>
       </p:sp>
       <p:sp>
         <p:nvSpPr>
@@ -2086,6 +2100,13 @@
             <a:schemeClr val="lt1"/>
           </a:fontRef>
         </p:style>
+        <p:txBody>
+          <a:bodyPr/>
+          <a:lstStyle/>
+          <a:p>
+            <a:endParaRPr lang="fr-FR"/>
+          </a:p>
+        </p:txBody>
       </p:sp>
       <p:sp>
         <p:nvSpPr>
@@ -2335,6 +2356,13 @@
             <a:schemeClr val="lt1"/>
           </a:fontRef>
         </p:style>
+        <p:txBody>
+          <a:bodyPr/>
+          <a:lstStyle/>
+          <a:p>
+            <a:endParaRPr lang="fr-FR"/>
+          </a:p>
+        </p:txBody>
       </p:sp>
       <p:sp>
         <p:nvSpPr>
@@ -2963,6 +2991,13 @@
             <a:schemeClr val="lt1"/>
           </a:fontRef>
         </p:style>
+        <p:txBody>
+          <a:bodyPr/>
+          <a:lstStyle/>
+          <a:p>
+            <a:endParaRPr lang="fr-FR"/>
+          </a:p>
+        </p:txBody>
       </p:sp>
       <p:pic>
         <p:nvPicPr>
@@ -3066,6 +3101,13 @@
             <a:schemeClr val="lt1"/>
           </a:fontRef>
         </p:style>
+        <p:txBody>
+          <a:bodyPr/>
+          <a:lstStyle/>
+          <a:p>
+            <a:endParaRPr lang="fr-FR"/>
+          </a:p>
+        </p:txBody>
       </p:sp>
       <p:sp>
         <p:nvSpPr>
@@ -3836,6 +3878,13 @@
             <a:schemeClr val="lt1"/>
           </a:fontRef>
         </p:style>
+        <p:txBody>
+          <a:bodyPr/>
+          <a:lstStyle/>
+          <a:p>
+            <a:endParaRPr lang="fr-FR"/>
+          </a:p>
+        </p:txBody>
       </p:sp>
       <p:sp>
         <p:nvSpPr>
@@ -5281,122 +5330,6 @@
           </a:p>
         </p:txBody>
       </p:sp>
-      <p:pic>
-        <p:nvPicPr>
-          <p:cNvPr id="6" name="Image 5">
-            <a:extLst>
-              <a:ext uri="{FF2B5EF4-FFF2-40B4-BE49-F238E27FC236}">
-                <a16:creationId xmlns:a16="http://schemas.microsoft.com/office/drawing/2014/main" id="{23671885-313B-A3F3-C15B-427C69D9C628}"/>
-              </a:ext>
-            </a:extLst>
-          </p:cNvPr>
-          <p:cNvPicPr>
-            <a:picLocks noChangeAspect="1"/>
-          </p:cNvPicPr>
-          <p:nvPr/>
-        </p:nvPicPr>
-        <p:blipFill>
-          <a:blip r:embed="rId3">
-            <a:extLst>
-              <a:ext uri="{28A0092B-C50C-407E-A947-70E740481C1C}">
-                <a14:useLocalDpi xmlns:a14="http://schemas.microsoft.com/office/drawing/2010/main" val="0"/>
-              </a:ext>
-            </a:extLst>
-          </a:blip>
-          <a:stretch>
-            <a:fillRect/>
-          </a:stretch>
-        </p:blipFill>
-        <p:spPr>
-          <a:xfrm>
-            <a:off x="8343900" y="1897512"/>
-            <a:ext cx="3643168" cy="2643487"/>
-          </a:xfrm>
-          <a:prstGeom prst="rect">
-            <a:avLst/>
-          </a:prstGeom>
-        </p:spPr>
-      </p:pic>
-      <p:cxnSp>
-        <p:nvCxnSpPr>
-          <p:cNvPr id="10" name="Connecteur en arc 9">
-            <a:extLst>
-              <a:ext uri="{FF2B5EF4-FFF2-40B4-BE49-F238E27FC236}">
-                <a16:creationId xmlns:a16="http://schemas.microsoft.com/office/drawing/2014/main" id="{A4EBC636-C6FC-AE6F-C8E7-C20C5F207762}"/>
-              </a:ext>
-            </a:extLst>
-          </p:cNvPr>
-          <p:cNvCxnSpPr>
-            <a:cxnSpLocks/>
-          </p:cNvCxnSpPr>
-          <p:nvPr/>
-        </p:nvCxnSpPr>
-        <p:spPr>
-          <a:xfrm rot="16200000" flipH="1">
-            <a:off x="8454000" y="3322363"/>
-            <a:ext cx="803562" cy="282545"/>
-          </a:xfrm>
-          <a:prstGeom prst="curvedConnector3">
-            <a:avLst/>
-          </a:prstGeom>
-          <a:ln w="44450">
-            <a:tailEnd type="triangle"/>
-          </a:ln>
-        </p:spPr>
-        <p:style>
-          <a:lnRef idx="1">
-            <a:schemeClr val="accent1"/>
-          </a:lnRef>
-          <a:fillRef idx="0">
-            <a:schemeClr val="accent1"/>
-          </a:fillRef>
-          <a:effectRef idx="0">
-            <a:schemeClr val="accent1"/>
-          </a:effectRef>
-          <a:fontRef idx="minor">
-            <a:schemeClr val="tx1"/>
-          </a:fontRef>
-        </p:style>
-      </p:cxnSp>
-      <p:sp>
-        <p:nvSpPr>
-          <p:cNvPr id="12" name="ZoneTexte 11">
-            <a:extLst>
-              <a:ext uri="{FF2B5EF4-FFF2-40B4-BE49-F238E27FC236}">
-                <a16:creationId xmlns:a16="http://schemas.microsoft.com/office/drawing/2014/main" id="{28A4A0F1-145D-E7F8-62DE-95EB45D98E8F}"/>
-              </a:ext>
-            </a:extLst>
-          </p:cNvPr>
-          <p:cNvSpPr txBox="1"/>
-          <p:nvPr/>
-        </p:nvSpPr>
-        <p:spPr>
-          <a:xfrm>
-            <a:off x="8534400" y="2687782"/>
-            <a:ext cx="614842" cy="369332"/>
-          </a:xfrm>
-          <a:prstGeom prst="rect">
-            <a:avLst/>
-          </a:prstGeom>
-          <a:noFill/>
-        </p:spPr>
-        <p:txBody>
-          <a:bodyPr wrap="square" rtlCol="0">
-            <a:spAutoFit/>
-          </a:bodyPr>
-          <a:lstStyle/>
-          <a:p>
-            <a:r>
-              <a:rPr lang="fr-FR" b="1" dirty="0">
-                <a:solidFill>
-                  <a:schemeClr val="accent2"/>
-                </a:solidFill>
-              </a:rPr>
-              <a:t>Ici</a:t>
-            </a:r>
-          </a:p>
-        </p:txBody>
-      </p:sp>
     </p:spTree>
     <p:extLst>
       <p:ext uri="{BB962C8B-B14F-4D97-AF65-F5344CB8AC3E}">
@@ -5694,23 +5627,7 @@
             </a:r>
             <a:r>
               <a:rPr lang="fr-FR" dirty="0"/>
-              <a:t> dans séance 1) et/ou ont envoyé par mail avant la séance 2 (à l’</a:t>
-            </a:r>
-            <a:r>
-              <a:rPr lang="fr-FR" dirty="0" err="1"/>
-              <a:t>enseignant.e</a:t>
-            </a:r>
-            <a:r>
-              <a:rPr lang="fr-FR" dirty="0"/>
-              <a:t>) les membres du groupe (si pas fait sur </a:t>
-            </a:r>
-            <a:r>
-              <a:rPr lang="fr-FR" dirty="0" err="1"/>
-              <a:t>moodle</a:t>
-            </a:r>
-            <a:r>
-              <a:rPr lang="fr-FR" dirty="0"/>
-              <a:t>) + ils ont réfléchi à leur idée de thème et le jeu de données a priori utilisé (tiré de </a:t>
+              <a:t> dans séance 1) + ils ont réfléchi à leur idée de thème et le jeu de données a priori utilisé (tiré de </a:t>
             </a:r>
             <a:r>
               <a:rPr lang="fr-FR" dirty="0" err="1"/>
@@ -6333,7 +6250,7 @@
           <p:nvPr>
             <p:extLst>
               <p:ext uri="{D42A27DB-BD31-4B8C-83A1-F6EECF244321}">
-                <p14:modId xmlns:p14="http://schemas.microsoft.com/office/powerpoint/2010/main" val="70240510"/>
+                <p14:modId xmlns:p14="http://schemas.microsoft.com/office/powerpoint/2010/main" val="3971176750"/>
               </p:ext>
             </p:extLst>
           </p:nvPr>
@@ -6988,7 +6905,7 @@
                           <a:ea typeface="+mn-ea"/>
                           <a:cs typeface="+mn-cs"/>
                         </a:rPr>
-                        <a:t>EXPOSE en groupe sur le 4 pages</a:t>
+                        <a:t>EXPOSÉ en groupe sur le 4 pages</a:t>
                       </a:r>
                       <a:endParaRPr lang="fr-FR" sz="1800" b="0" dirty="0"/>
                     </a:p>
@@ -7267,7 +7184,7 @@
               <a:rPr lang="fr-FR" dirty="0">
                 <a:effectLst/>
               </a:rPr>
-              <a:t>Maitriser les manipulations dans JAMOVI et notions stat d’une séance à l’autre</a:t>
+              <a:t> Maitriser les manipulations dans JAMOVI et notions stat d’une séance à l’autre</a:t>
             </a:r>
           </a:p>
           <a:p>
@@ -7916,7 +7833,7 @@
             </a:r>
             <a:r>
               <a:rPr lang="fr-FR" dirty="0" err="1"/>
-              <a:t>étudiant.es</a:t>
+              <a:t>étudiant·es</a:t>
             </a:r>
             <a:endParaRPr lang="fr-FR" dirty="0"/>
           </a:p>

</xml_diff>

<commit_message>
update Seances order in slides S1
</commit_message>
<xml_diff>
--- a/Mignot/Diapos/S1 - diapo DECA2.pptx
+++ b/Mignot/Diapos/S1 - diapo DECA2.pptx
@@ -211,7 +211,7 @@
           <a:p>
             <a:fld id="{CCD25262-7ADE-304A-B1BB-4A7EDACB30E0}" type="datetimeFigureOut">
               <a:rPr lang="fr-FR" smtClean="0"/>
-              <a:t>05/01/2026</a:t>
+              <a:t>06/01/2026</a:t>
             </a:fld>
             <a:endParaRPr lang="fr-FR"/>
           </a:p>
@@ -6250,7 +6250,7 @@
           <p:nvPr>
             <p:extLst>
               <p:ext uri="{D42A27DB-BD31-4B8C-83A1-F6EECF244321}">
-                <p14:modId xmlns:p14="http://schemas.microsoft.com/office/powerpoint/2010/main" val="3971176750"/>
+                <p14:modId xmlns:p14="http://schemas.microsoft.com/office/powerpoint/2010/main" val="4269806983"/>
               </p:ext>
             </p:extLst>
           </p:nvPr>
@@ -6644,7 +6644,7 @@
                           <a:ea typeface="+mn-ea"/>
                           <a:cs typeface="+mn-cs"/>
                         </a:rPr>
-                        <a:t>Visualisation graphique de résultats d’enquête</a:t>
+                        <a:t>Recodages et construction d’indicateurs</a:t>
                       </a:r>
                       <a:endParaRPr lang="fr-FR" sz="1800" b="0" dirty="0"/>
                     </a:p>
@@ -6707,8 +6707,9 @@
                           <a:ea typeface="+mn-ea"/>
                           <a:cs typeface="+mn-cs"/>
                         </a:rPr>
-                        <a:t>Recodages et construction d’indicateurs</a:t>
+                        <a:t>Visualisation graphique de résultats d’enquête</a:t>
                       </a:r>
+                      <a:endParaRPr lang="fr-FR" sz="1800" b="0" dirty="0"/>
                     </a:p>
                   </a:txBody>
                   <a:tcPr/>

</xml_diff>